<commit_message>
End of module 3
</commit_message>
<xml_diff>
--- a/Slides/Module 3 - Creating an interface.pptx
+++ b/Slides/Module 3 - Creating an interface.pptx
@@ -5395,9 +5395,243 @@
   <p:timing>
     <p:tnLst>
       <p:par>
-        <p:cTn id="1" dur="indefinite" restart="never" nodeType="tmRoot"/>
+        <p:cTn id="1" dur="indefinite" restart="never" nodeType="tmRoot">
+          <p:childTnLst>
+            <p:seq concurrent="1" nextAc="seek">
+              <p:cTn id="2" dur="indefinite" nodeType="mainSeq">
+                <p:childTnLst>
+                  <p:par>
+                    <p:cTn id="3" fill="hold">
+                      <p:stCondLst>
+                        <p:cond delay="indefinite"/>
+                      </p:stCondLst>
+                      <p:childTnLst>
+                        <p:par>
+                          <p:cTn id="4" fill="hold">
+                            <p:stCondLst>
+                              <p:cond delay="0"/>
+                            </p:stCondLst>
+                            <p:childTnLst>
+                              <p:par>
+                                <p:cTn id="5" presetID="10" presetClass="entr" presetSubtype="0" fill="hold" grpId="0" nodeType="clickEffect">
+                                  <p:stCondLst>
+                                    <p:cond delay="0"/>
+                                  </p:stCondLst>
+                                  <p:childTnLst>
+                                    <p:set>
+                                      <p:cBhvr>
+                                        <p:cTn id="6" dur="1" fill="hold">
+                                          <p:stCondLst>
+                                            <p:cond delay="0"/>
+                                          </p:stCondLst>
+                                        </p:cTn>
+                                        <p:tgtEl>
+                                          <p:spTgt spid="3">
+                                            <p:txEl>
+                                              <p:pRg st="0" end="0"/>
+                                            </p:txEl>
+                                          </p:spTgt>
+                                        </p:tgtEl>
+                                        <p:attrNameLst>
+                                          <p:attrName>style.visibility</p:attrName>
+                                        </p:attrNameLst>
+                                      </p:cBhvr>
+                                      <p:to>
+                                        <p:strVal val="visible"/>
+                                      </p:to>
+                                    </p:set>
+                                    <p:animEffect transition="in" filter="fade">
+                                      <p:cBhvr>
+                                        <p:cTn id="7" dur="500"/>
+                                        <p:tgtEl>
+                                          <p:spTgt spid="3">
+                                            <p:txEl>
+                                              <p:pRg st="0" end="0"/>
+                                            </p:txEl>
+                                          </p:spTgt>
+                                        </p:tgtEl>
+                                      </p:cBhvr>
+                                    </p:animEffect>
+                                  </p:childTnLst>
+                                </p:cTn>
+                              </p:par>
+                            </p:childTnLst>
+                          </p:cTn>
+                        </p:par>
+                      </p:childTnLst>
+                    </p:cTn>
+                  </p:par>
+                  <p:par>
+                    <p:cTn id="8" fill="hold">
+                      <p:stCondLst>
+                        <p:cond delay="indefinite"/>
+                      </p:stCondLst>
+                      <p:childTnLst>
+                        <p:par>
+                          <p:cTn id="9" fill="hold">
+                            <p:stCondLst>
+                              <p:cond delay="0"/>
+                            </p:stCondLst>
+                            <p:childTnLst>
+                              <p:par>
+                                <p:cTn id="10" presetID="10" presetClass="entr" presetSubtype="0" fill="hold" grpId="0" nodeType="clickEffect">
+                                  <p:stCondLst>
+                                    <p:cond delay="0"/>
+                                  </p:stCondLst>
+                                  <p:childTnLst>
+                                    <p:set>
+                                      <p:cBhvr>
+                                        <p:cTn id="11" dur="1" fill="hold">
+                                          <p:stCondLst>
+                                            <p:cond delay="0"/>
+                                          </p:stCondLst>
+                                        </p:cTn>
+                                        <p:tgtEl>
+                                          <p:spTgt spid="3">
+                                            <p:txEl>
+                                              <p:pRg st="2" end="2"/>
+                                            </p:txEl>
+                                          </p:spTgt>
+                                        </p:tgtEl>
+                                        <p:attrNameLst>
+                                          <p:attrName>style.visibility</p:attrName>
+                                        </p:attrNameLst>
+                                      </p:cBhvr>
+                                      <p:to>
+                                        <p:strVal val="visible"/>
+                                      </p:to>
+                                    </p:set>
+                                    <p:animEffect transition="in" filter="fade">
+                                      <p:cBhvr>
+                                        <p:cTn id="12" dur="500"/>
+                                        <p:tgtEl>
+                                          <p:spTgt spid="3">
+                                            <p:txEl>
+                                              <p:pRg st="2" end="2"/>
+                                            </p:txEl>
+                                          </p:spTgt>
+                                        </p:tgtEl>
+                                      </p:cBhvr>
+                                    </p:animEffect>
+                                  </p:childTnLst>
+                                </p:cTn>
+                              </p:par>
+                              <p:par>
+                                <p:cTn id="13" presetID="10" presetClass="entr" presetSubtype="0" fill="hold" grpId="0" nodeType="withEffect">
+                                  <p:stCondLst>
+                                    <p:cond delay="0"/>
+                                  </p:stCondLst>
+                                  <p:childTnLst>
+                                    <p:set>
+                                      <p:cBhvr>
+                                        <p:cTn id="14" dur="1" fill="hold">
+                                          <p:stCondLst>
+                                            <p:cond delay="0"/>
+                                          </p:stCondLst>
+                                        </p:cTn>
+                                        <p:tgtEl>
+                                          <p:spTgt spid="3">
+                                            <p:txEl>
+                                              <p:pRg st="3" end="3"/>
+                                            </p:txEl>
+                                          </p:spTgt>
+                                        </p:tgtEl>
+                                        <p:attrNameLst>
+                                          <p:attrName>style.visibility</p:attrName>
+                                        </p:attrNameLst>
+                                      </p:cBhvr>
+                                      <p:to>
+                                        <p:strVal val="visible"/>
+                                      </p:to>
+                                    </p:set>
+                                    <p:animEffect transition="in" filter="fade">
+                                      <p:cBhvr>
+                                        <p:cTn id="15" dur="500"/>
+                                        <p:tgtEl>
+                                          <p:spTgt spid="3">
+                                            <p:txEl>
+                                              <p:pRg st="3" end="3"/>
+                                            </p:txEl>
+                                          </p:spTgt>
+                                        </p:tgtEl>
+                                      </p:cBhvr>
+                                    </p:animEffect>
+                                  </p:childTnLst>
+                                </p:cTn>
+                              </p:par>
+                              <p:par>
+                                <p:cTn id="16" presetID="10" presetClass="entr" presetSubtype="0" fill="hold" grpId="0" nodeType="withEffect">
+                                  <p:stCondLst>
+                                    <p:cond delay="0"/>
+                                  </p:stCondLst>
+                                  <p:childTnLst>
+                                    <p:set>
+                                      <p:cBhvr>
+                                        <p:cTn id="17" dur="1" fill="hold">
+                                          <p:stCondLst>
+                                            <p:cond delay="0"/>
+                                          </p:stCondLst>
+                                        </p:cTn>
+                                        <p:tgtEl>
+                                          <p:spTgt spid="3">
+                                            <p:txEl>
+                                              <p:pRg st="4" end="4"/>
+                                            </p:txEl>
+                                          </p:spTgt>
+                                        </p:tgtEl>
+                                        <p:attrNameLst>
+                                          <p:attrName>style.visibility</p:attrName>
+                                        </p:attrNameLst>
+                                      </p:cBhvr>
+                                      <p:to>
+                                        <p:strVal val="visible"/>
+                                      </p:to>
+                                    </p:set>
+                                    <p:animEffect transition="in" filter="fade">
+                                      <p:cBhvr>
+                                        <p:cTn id="18" dur="500"/>
+                                        <p:tgtEl>
+                                          <p:spTgt spid="3">
+                                            <p:txEl>
+                                              <p:pRg st="4" end="4"/>
+                                            </p:txEl>
+                                          </p:spTgt>
+                                        </p:tgtEl>
+                                      </p:cBhvr>
+                                    </p:animEffect>
+                                  </p:childTnLst>
+                                </p:cTn>
+                              </p:par>
+                            </p:childTnLst>
+                          </p:cTn>
+                        </p:par>
+                      </p:childTnLst>
+                    </p:cTn>
+                  </p:par>
+                </p:childTnLst>
+              </p:cTn>
+              <p:prevCondLst>
+                <p:cond evt="onPrev" delay="0">
+                  <p:tgtEl>
+                    <p:sldTgt/>
+                  </p:tgtEl>
+                </p:cond>
+              </p:prevCondLst>
+              <p:nextCondLst>
+                <p:cond evt="onNext" delay="0">
+                  <p:tgtEl>
+                    <p:sldTgt/>
+                  </p:tgtEl>
+                </p:cond>
+              </p:nextCondLst>
+            </p:seq>
+          </p:childTnLst>
+        </p:cTn>
       </p:par>
     </p:tnLst>
+    <p:bldLst>
+      <p:bldP spid="3" grpId="0" build="p"/>
+    </p:bldLst>
   </p:timing>
 </p:sld>
 </file>
@@ -5530,6 +5764,462 @@
   <p:clrMapOvr>
     <a:masterClrMapping/>
   </p:clrMapOvr>
+  <p:timing>
+    <p:tnLst>
+      <p:par>
+        <p:cTn id="1" dur="indefinite" restart="never" nodeType="tmRoot">
+          <p:childTnLst>
+            <p:seq concurrent="1" nextAc="seek">
+              <p:cTn id="2" dur="indefinite" nodeType="mainSeq">
+                <p:childTnLst>
+                  <p:par>
+                    <p:cTn id="3" fill="hold">
+                      <p:stCondLst>
+                        <p:cond delay="indefinite"/>
+                      </p:stCondLst>
+                      <p:childTnLst>
+                        <p:par>
+                          <p:cTn id="4" fill="hold">
+                            <p:stCondLst>
+                              <p:cond delay="0"/>
+                            </p:stCondLst>
+                            <p:childTnLst>
+                              <p:par>
+                                <p:cTn id="5" presetID="10" presetClass="entr" presetSubtype="0" fill="hold" grpId="0" nodeType="clickEffect">
+                                  <p:stCondLst>
+                                    <p:cond delay="0"/>
+                                  </p:stCondLst>
+                                  <p:childTnLst>
+                                    <p:set>
+                                      <p:cBhvr>
+                                        <p:cTn id="6" dur="1" fill="hold">
+                                          <p:stCondLst>
+                                            <p:cond delay="0"/>
+                                          </p:stCondLst>
+                                        </p:cTn>
+                                        <p:tgtEl>
+                                          <p:spTgt spid="3">
+                                            <p:txEl>
+                                              <p:pRg st="0" end="0"/>
+                                            </p:txEl>
+                                          </p:spTgt>
+                                        </p:tgtEl>
+                                        <p:attrNameLst>
+                                          <p:attrName>style.visibility</p:attrName>
+                                        </p:attrNameLst>
+                                      </p:cBhvr>
+                                      <p:to>
+                                        <p:strVal val="visible"/>
+                                      </p:to>
+                                    </p:set>
+                                    <p:animEffect transition="in" filter="fade">
+                                      <p:cBhvr>
+                                        <p:cTn id="7" dur="500"/>
+                                        <p:tgtEl>
+                                          <p:spTgt spid="3">
+                                            <p:txEl>
+                                              <p:pRg st="0" end="0"/>
+                                            </p:txEl>
+                                          </p:spTgt>
+                                        </p:tgtEl>
+                                      </p:cBhvr>
+                                    </p:animEffect>
+                                  </p:childTnLst>
+                                </p:cTn>
+                              </p:par>
+                              <p:par>
+                                <p:cTn id="8" presetID="10" presetClass="entr" presetSubtype="0" fill="hold" grpId="0" nodeType="withEffect">
+                                  <p:stCondLst>
+                                    <p:cond delay="0"/>
+                                  </p:stCondLst>
+                                  <p:childTnLst>
+                                    <p:set>
+                                      <p:cBhvr>
+                                        <p:cTn id="9" dur="1" fill="hold">
+                                          <p:stCondLst>
+                                            <p:cond delay="0"/>
+                                          </p:stCondLst>
+                                        </p:cTn>
+                                        <p:tgtEl>
+                                          <p:spTgt spid="3">
+                                            <p:txEl>
+                                              <p:pRg st="1" end="1"/>
+                                            </p:txEl>
+                                          </p:spTgt>
+                                        </p:tgtEl>
+                                        <p:attrNameLst>
+                                          <p:attrName>style.visibility</p:attrName>
+                                        </p:attrNameLst>
+                                      </p:cBhvr>
+                                      <p:to>
+                                        <p:strVal val="visible"/>
+                                      </p:to>
+                                    </p:set>
+                                    <p:animEffect transition="in" filter="fade">
+                                      <p:cBhvr>
+                                        <p:cTn id="10" dur="500"/>
+                                        <p:tgtEl>
+                                          <p:spTgt spid="3">
+                                            <p:txEl>
+                                              <p:pRg st="1" end="1"/>
+                                            </p:txEl>
+                                          </p:spTgt>
+                                        </p:tgtEl>
+                                      </p:cBhvr>
+                                    </p:animEffect>
+                                  </p:childTnLst>
+                                </p:cTn>
+                              </p:par>
+                              <p:par>
+                                <p:cTn id="11" presetID="10" presetClass="entr" presetSubtype="0" fill="hold" grpId="0" nodeType="withEffect">
+                                  <p:stCondLst>
+                                    <p:cond delay="0"/>
+                                  </p:stCondLst>
+                                  <p:childTnLst>
+                                    <p:set>
+                                      <p:cBhvr>
+                                        <p:cTn id="12" dur="1" fill="hold">
+                                          <p:stCondLst>
+                                            <p:cond delay="0"/>
+                                          </p:stCondLst>
+                                        </p:cTn>
+                                        <p:tgtEl>
+                                          <p:spTgt spid="3">
+                                            <p:txEl>
+                                              <p:pRg st="2" end="2"/>
+                                            </p:txEl>
+                                          </p:spTgt>
+                                        </p:tgtEl>
+                                        <p:attrNameLst>
+                                          <p:attrName>style.visibility</p:attrName>
+                                        </p:attrNameLst>
+                                      </p:cBhvr>
+                                      <p:to>
+                                        <p:strVal val="visible"/>
+                                      </p:to>
+                                    </p:set>
+                                    <p:animEffect transition="in" filter="fade">
+                                      <p:cBhvr>
+                                        <p:cTn id="13" dur="500"/>
+                                        <p:tgtEl>
+                                          <p:spTgt spid="3">
+                                            <p:txEl>
+                                              <p:pRg st="2" end="2"/>
+                                            </p:txEl>
+                                          </p:spTgt>
+                                        </p:tgtEl>
+                                      </p:cBhvr>
+                                    </p:animEffect>
+                                  </p:childTnLst>
+                                </p:cTn>
+                              </p:par>
+                              <p:par>
+                                <p:cTn id="14" presetID="10" presetClass="entr" presetSubtype="0" fill="hold" grpId="0" nodeType="withEffect">
+                                  <p:stCondLst>
+                                    <p:cond delay="0"/>
+                                  </p:stCondLst>
+                                  <p:childTnLst>
+                                    <p:set>
+                                      <p:cBhvr>
+                                        <p:cTn id="15" dur="1" fill="hold">
+                                          <p:stCondLst>
+                                            <p:cond delay="0"/>
+                                          </p:stCondLst>
+                                        </p:cTn>
+                                        <p:tgtEl>
+                                          <p:spTgt spid="3">
+                                            <p:txEl>
+                                              <p:pRg st="3" end="3"/>
+                                            </p:txEl>
+                                          </p:spTgt>
+                                        </p:tgtEl>
+                                        <p:attrNameLst>
+                                          <p:attrName>style.visibility</p:attrName>
+                                        </p:attrNameLst>
+                                      </p:cBhvr>
+                                      <p:to>
+                                        <p:strVal val="visible"/>
+                                      </p:to>
+                                    </p:set>
+                                    <p:animEffect transition="in" filter="fade">
+                                      <p:cBhvr>
+                                        <p:cTn id="16" dur="500"/>
+                                        <p:tgtEl>
+                                          <p:spTgt spid="3">
+                                            <p:txEl>
+                                              <p:pRg st="3" end="3"/>
+                                            </p:txEl>
+                                          </p:spTgt>
+                                        </p:tgtEl>
+                                      </p:cBhvr>
+                                    </p:animEffect>
+                                  </p:childTnLst>
+                                </p:cTn>
+                              </p:par>
+                            </p:childTnLst>
+                          </p:cTn>
+                        </p:par>
+                      </p:childTnLst>
+                    </p:cTn>
+                  </p:par>
+                  <p:par>
+                    <p:cTn id="17" fill="hold">
+                      <p:stCondLst>
+                        <p:cond delay="indefinite"/>
+                      </p:stCondLst>
+                      <p:childTnLst>
+                        <p:par>
+                          <p:cTn id="18" fill="hold">
+                            <p:stCondLst>
+                              <p:cond delay="0"/>
+                            </p:stCondLst>
+                            <p:childTnLst>
+                              <p:par>
+                                <p:cTn id="19" presetID="10" presetClass="entr" presetSubtype="0" fill="hold" grpId="0" nodeType="clickEffect">
+                                  <p:stCondLst>
+                                    <p:cond delay="0"/>
+                                  </p:stCondLst>
+                                  <p:childTnLst>
+                                    <p:set>
+                                      <p:cBhvr>
+                                        <p:cTn id="20" dur="1" fill="hold">
+                                          <p:stCondLst>
+                                            <p:cond delay="0"/>
+                                          </p:stCondLst>
+                                        </p:cTn>
+                                        <p:tgtEl>
+                                          <p:spTgt spid="3">
+                                            <p:txEl>
+                                              <p:pRg st="4" end="4"/>
+                                            </p:txEl>
+                                          </p:spTgt>
+                                        </p:tgtEl>
+                                        <p:attrNameLst>
+                                          <p:attrName>style.visibility</p:attrName>
+                                        </p:attrNameLst>
+                                      </p:cBhvr>
+                                      <p:to>
+                                        <p:strVal val="visible"/>
+                                      </p:to>
+                                    </p:set>
+                                    <p:animEffect transition="in" filter="fade">
+                                      <p:cBhvr>
+                                        <p:cTn id="21" dur="500"/>
+                                        <p:tgtEl>
+                                          <p:spTgt spid="3">
+                                            <p:txEl>
+                                              <p:pRg st="4" end="4"/>
+                                            </p:txEl>
+                                          </p:spTgt>
+                                        </p:tgtEl>
+                                      </p:cBhvr>
+                                    </p:animEffect>
+                                  </p:childTnLst>
+                                </p:cTn>
+                              </p:par>
+                              <p:par>
+                                <p:cTn id="22" presetID="10" presetClass="entr" presetSubtype="0" fill="hold" grpId="0" nodeType="withEffect">
+                                  <p:stCondLst>
+                                    <p:cond delay="0"/>
+                                  </p:stCondLst>
+                                  <p:childTnLst>
+                                    <p:set>
+                                      <p:cBhvr>
+                                        <p:cTn id="23" dur="1" fill="hold">
+                                          <p:stCondLst>
+                                            <p:cond delay="0"/>
+                                          </p:stCondLst>
+                                        </p:cTn>
+                                        <p:tgtEl>
+                                          <p:spTgt spid="3">
+                                            <p:txEl>
+                                              <p:pRg st="5" end="5"/>
+                                            </p:txEl>
+                                          </p:spTgt>
+                                        </p:tgtEl>
+                                        <p:attrNameLst>
+                                          <p:attrName>style.visibility</p:attrName>
+                                        </p:attrNameLst>
+                                      </p:cBhvr>
+                                      <p:to>
+                                        <p:strVal val="visible"/>
+                                      </p:to>
+                                    </p:set>
+                                    <p:animEffect transition="in" filter="fade">
+                                      <p:cBhvr>
+                                        <p:cTn id="24" dur="500"/>
+                                        <p:tgtEl>
+                                          <p:spTgt spid="3">
+                                            <p:txEl>
+                                              <p:pRg st="5" end="5"/>
+                                            </p:txEl>
+                                          </p:spTgt>
+                                        </p:tgtEl>
+                                      </p:cBhvr>
+                                    </p:animEffect>
+                                  </p:childTnLst>
+                                </p:cTn>
+                              </p:par>
+                              <p:par>
+                                <p:cTn id="25" presetID="10" presetClass="entr" presetSubtype="0" fill="hold" grpId="0" nodeType="withEffect">
+                                  <p:stCondLst>
+                                    <p:cond delay="0"/>
+                                  </p:stCondLst>
+                                  <p:childTnLst>
+                                    <p:set>
+                                      <p:cBhvr>
+                                        <p:cTn id="26" dur="1" fill="hold">
+                                          <p:stCondLst>
+                                            <p:cond delay="0"/>
+                                          </p:stCondLst>
+                                        </p:cTn>
+                                        <p:tgtEl>
+                                          <p:spTgt spid="3">
+                                            <p:txEl>
+                                              <p:pRg st="6" end="6"/>
+                                            </p:txEl>
+                                          </p:spTgt>
+                                        </p:tgtEl>
+                                        <p:attrNameLst>
+                                          <p:attrName>style.visibility</p:attrName>
+                                        </p:attrNameLst>
+                                      </p:cBhvr>
+                                      <p:to>
+                                        <p:strVal val="visible"/>
+                                      </p:to>
+                                    </p:set>
+                                    <p:animEffect transition="in" filter="fade">
+                                      <p:cBhvr>
+                                        <p:cTn id="27" dur="500"/>
+                                        <p:tgtEl>
+                                          <p:spTgt spid="3">
+                                            <p:txEl>
+                                              <p:pRg st="6" end="6"/>
+                                            </p:txEl>
+                                          </p:spTgt>
+                                        </p:tgtEl>
+                                      </p:cBhvr>
+                                    </p:animEffect>
+                                  </p:childTnLst>
+                                </p:cTn>
+                              </p:par>
+                              <p:par>
+                                <p:cTn id="28" presetID="10" presetClass="entr" presetSubtype="0" fill="hold" grpId="0" nodeType="withEffect">
+                                  <p:stCondLst>
+                                    <p:cond delay="0"/>
+                                  </p:stCondLst>
+                                  <p:childTnLst>
+                                    <p:set>
+                                      <p:cBhvr>
+                                        <p:cTn id="29" dur="1" fill="hold">
+                                          <p:stCondLst>
+                                            <p:cond delay="0"/>
+                                          </p:stCondLst>
+                                        </p:cTn>
+                                        <p:tgtEl>
+                                          <p:spTgt spid="3">
+                                            <p:txEl>
+                                              <p:pRg st="7" end="7"/>
+                                            </p:txEl>
+                                          </p:spTgt>
+                                        </p:tgtEl>
+                                        <p:attrNameLst>
+                                          <p:attrName>style.visibility</p:attrName>
+                                        </p:attrNameLst>
+                                      </p:cBhvr>
+                                      <p:to>
+                                        <p:strVal val="visible"/>
+                                      </p:to>
+                                    </p:set>
+                                    <p:animEffect transition="in" filter="fade">
+                                      <p:cBhvr>
+                                        <p:cTn id="30" dur="500"/>
+                                        <p:tgtEl>
+                                          <p:spTgt spid="3">
+                                            <p:txEl>
+                                              <p:pRg st="7" end="7"/>
+                                            </p:txEl>
+                                          </p:spTgt>
+                                        </p:tgtEl>
+                                      </p:cBhvr>
+                                    </p:animEffect>
+                                  </p:childTnLst>
+                                </p:cTn>
+                              </p:par>
+                              <p:par>
+                                <p:cTn id="31" presetID="10" presetClass="entr" presetSubtype="0" fill="hold" grpId="0" nodeType="withEffect">
+                                  <p:stCondLst>
+                                    <p:cond delay="0"/>
+                                  </p:stCondLst>
+                                  <p:childTnLst>
+                                    <p:set>
+                                      <p:cBhvr>
+                                        <p:cTn id="32" dur="1" fill="hold">
+                                          <p:stCondLst>
+                                            <p:cond delay="0"/>
+                                          </p:stCondLst>
+                                        </p:cTn>
+                                        <p:tgtEl>
+                                          <p:spTgt spid="3">
+                                            <p:txEl>
+                                              <p:pRg st="8" end="8"/>
+                                            </p:txEl>
+                                          </p:spTgt>
+                                        </p:tgtEl>
+                                        <p:attrNameLst>
+                                          <p:attrName>style.visibility</p:attrName>
+                                        </p:attrNameLst>
+                                      </p:cBhvr>
+                                      <p:to>
+                                        <p:strVal val="visible"/>
+                                      </p:to>
+                                    </p:set>
+                                    <p:animEffect transition="in" filter="fade">
+                                      <p:cBhvr>
+                                        <p:cTn id="33" dur="500"/>
+                                        <p:tgtEl>
+                                          <p:spTgt spid="3">
+                                            <p:txEl>
+                                              <p:pRg st="8" end="8"/>
+                                            </p:txEl>
+                                          </p:spTgt>
+                                        </p:tgtEl>
+                                      </p:cBhvr>
+                                    </p:animEffect>
+                                  </p:childTnLst>
+                                </p:cTn>
+                              </p:par>
+                            </p:childTnLst>
+                          </p:cTn>
+                        </p:par>
+                      </p:childTnLst>
+                    </p:cTn>
+                  </p:par>
+                </p:childTnLst>
+              </p:cTn>
+              <p:prevCondLst>
+                <p:cond evt="onPrev" delay="0">
+                  <p:tgtEl>
+                    <p:sldTgt/>
+                  </p:tgtEl>
+                </p:cond>
+              </p:prevCondLst>
+              <p:nextCondLst>
+                <p:cond evt="onNext" delay="0">
+                  <p:tgtEl>
+                    <p:sldTgt/>
+                  </p:tgtEl>
+                </p:cond>
+              </p:nextCondLst>
+            </p:seq>
+          </p:childTnLst>
+        </p:cTn>
+      </p:par>
+    </p:tnLst>
+    <p:bldLst>
+      <p:bldP spid="3" grpId="0" build="p"/>
+    </p:bldLst>
+  </p:timing>
 </p:sld>
 </file>
 
@@ -6395,6 +7085,524 @@
   <p:clrMapOvr>
     <a:masterClrMapping/>
   </p:clrMapOvr>
+  <p:timing>
+    <p:tnLst>
+      <p:par>
+        <p:cTn id="1" dur="indefinite" restart="never" nodeType="tmRoot">
+          <p:childTnLst>
+            <p:seq concurrent="1" nextAc="seek">
+              <p:cTn id="2" dur="indefinite" nodeType="mainSeq">
+                <p:childTnLst>
+                  <p:par>
+                    <p:cTn id="3" fill="hold">
+                      <p:stCondLst>
+                        <p:cond delay="indefinite"/>
+                      </p:stCondLst>
+                      <p:childTnLst>
+                        <p:par>
+                          <p:cTn id="4" fill="hold">
+                            <p:stCondLst>
+                              <p:cond delay="0"/>
+                            </p:stCondLst>
+                            <p:childTnLst>
+                              <p:par>
+                                <p:cTn id="5" presetID="10" presetClass="entr" presetSubtype="0" fill="hold" grpId="0" nodeType="clickEffect">
+                                  <p:stCondLst>
+                                    <p:cond delay="0"/>
+                                  </p:stCondLst>
+                                  <p:childTnLst>
+                                    <p:set>
+                                      <p:cBhvr>
+                                        <p:cTn id="6" dur="1" fill="hold">
+                                          <p:stCondLst>
+                                            <p:cond delay="0"/>
+                                          </p:stCondLst>
+                                        </p:cTn>
+                                        <p:tgtEl>
+                                          <p:spTgt spid="4"/>
+                                        </p:tgtEl>
+                                        <p:attrNameLst>
+                                          <p:attrName>style.visibility</p:attrName>
+                                        </p:attrNameLst>
+                                      </p:cBhvr>
+                                      <p:to>
+                                        <p:strVal val="visible"/>
+                                      </p:to>
+                                    </p:set>
+                                    <p:animEffect transition="in" filter="fade">
+                                      <p:cBhvr>
+                                        <p:cTn id="7" dur="500"/>
+                                        <p:tgtEl>
+                                          <p:spTgt spid="4"/>
+                                        </p:tgtEl>
+                                      </p:cBhvr>
+                                    </p:animEffect>
+                                  </p:childTnLst>
+                                </p:cTn>
+                              </p:par>
+                            </p:childTnLst>
+                          </p:cTn>
+                        </p:par>
+                      </p:childTnLst>
+                    </p:cTn>
+                  </p:par>
+                  <p:par>
+                    <p:cTn id="8" fill="hold">
+                      <p:stCondLst>
+                        <p:cond delay="indefinite"/>
+                      </p:stCondLst>
+                      <p:childTnLst>
+                        <p:par>
+                          <p:cTn id="9" fill="hold">
+                            <p:stCondLst>
+                              <p:cond delay="0"/>
+                            </p:stCondLst>
+                            <p:childTnLst>
+                              <p:par>
+                                <p:cTn id="10" presetID="10" presetClass="entr" presetSubtype="0" fill="hold" grpId="0" nodeType="clickEffect">
+                                  <p:stCondLst>
+                                    <p:cond delay="0"/>
+                                  </p:stCondLst>
+                                  <p:childTnLst>
+                                    <p:set>
+                                      <p:cBhvr>
+                                        <p:cTn id="11" dur="1" fill="hold">
+                                          <p:stCondLst>
+                                            <p:cond delay="0"/>
+                                          </p:stCondLst>
+                                        </p:cTn>
+                                        <p:tgtEl>
+                                          <p:spTgt spid="5"/>
+                                        </p:tgtEl>
+                                        <p:attrNameLst>
+                                          <p:attrName>style.visibility</p:attrName>
+                                        </p:attrNameLst>
+                                      </p:cBhvr>
+                                      <p:to>
+                                        <p:strVal val="visible"/>
+                                      </p:to>
+                                    </p:set>
+                                    <p:animEffect transition="in" filter="fade">
+                                      <p:cBhvr>
+                                        <p:cTn id="12" dur="500"/>
+                                        <p:tgtEl>
+                                          <p:spTgt spid="5"/>
+                                        </p:tgtEl>
+                                      </p:cBhvr>
+                                    </p:animEffect>
+                                  </p:childTnLst>
+                                </p:cTn>
+                              </p:par>
+                              <p:par>
+                                <p:cTn id="13" presetID="10" presetClass="entr" presetSubtype="0" fill="hold" grpId="0" nodeType="withEffect">
+                                  <p:stCondLst>
+                                    <p:cond delay="0"/>
+                                  </p:stCondLst>
+                                  <p:childTnLst>
+                                    <p:set>
+                                      <p:cBhvr>
+                                        <p:cTn id="14" dur="1" fill="hold">
+                                          <p:stCondLst>
+                                            <p:cond delay="0"/>
+                                          </p:stCondLst>
+                                        </p:cTn>
+                                        <p:tgtEl>
+                                          <p:spTgt spid="6"/>
+                                        </p:tgtEl>
+                                        <p:attrNameLst>
+                                          <p:attrName>style.visibility</p:attrName>
+                                        </p:attrNameLst>
+                                      </p:cBhvr>
+                                      <p:to>
+                                        <p:strVal val="visible"/>
+                                      </p:to>
+                                    </p:set>
+                                    <p:animEffect transition="in" filter="fade">
+                                      <p:cBhvr>
+                                        <p:cTn id="15" dur="500"/>
+                                        <p:tgtEl>
+                                          <p:spTgt spid="6"/>
+                                        </p:tgtEl>
+                                      </p:cBhvr>
+                                    </p:animEffect>
+                                  </p:childTnLst>
+                                </p:cTn>
+                              </p:par>
+                            </p:childTnLst>
+                          </p:cTn>
+                        </p:par>
+                      </p:childTnLst>
+                    </p:cTn>
+                  </p:par>
+                  <p:par>
+                    <p:cTn id="16" fill="hold">
+                      <p:stCondLst>
+                        <p:cond delay="indefinite"/>
+                      </p:stCondLst>
+                      <p:childTnLst>
+                        <p:par>
+                          <p:cTn id="17" fill="hold">
+                            <p:stCondLst>
+                              <p:cond delay="0"/>
+                            </p:stCondLst>
+                            <p:childTnLst>
+                              <p:par>
+                                <p:cTn id="18" presetID="10" presetClass="entr" presetSubtype="0" fill="hold" grpId="0" nodeType="clickEffect">
+                                  <p:stCondLst>
+                                    <p:cond delay="0"/>
+                                  </p:stCondLst>
+                                  <p:childTnLst>
+                                    <p:set>
+                                      <p:cBhvr>
+                                        <p:cTn id="19" dur="1" fill="hold">
+                                          <p:stCondLst>
+                                            <p:cond delay="0"/>
+                                          </p:stCondLst>
+                                        </p:cTn>
+                                        <p:tgtEl>
+                                          <p:spTgt spid="7"/>
+                                        </p:tgtEl>
+                                        <p:attrNameLst>
+                                          <p:attrName>style.visibility</p:attrName>
+                                        </p:attrNameLst>
+                                      </p:cBhvr>
+                                      <p:to>
+                                        <p:strVal val="visible"/>
+                                      </p:to>
+                                    </p:set>
+                                    <p:animEffect transition="in" filter="fade">
+                                      <p:cBhvr>
+                                        <p:cTn id="20" dur="500"/>
+                                        <p:tgtEl>
+                                          <p:spTgt spid="7"/>
+                                        </p:tgtEl>
+                                      </p:cBhvr>
+                                    </p:animEffect>
+                                  </p:childTnLst>
+                                </p:cTn>
+                              </p:par>
+                            </p:childTnLst>
+                          </p:cTn>
+                        </p:par>
+                      </p:childTnLst>
+                    </p:cTn>
+                  </p:par>
+                  <p:par>
+                    <p:cTn id="21" fill="hold">
+                      <p:stCondLst>
+                        <p:cond delay="indefinite"/>
+                      </p:stCondLst>
+                      <p:childTnLst>
+                        <p:par>
+                          <p:cTn id="22" fill="hold">
+                            <p:stCondLst>
+                              <p:cond delay="0"/>
+                            </p:stCondLst>
+                            <p:childTnLst>
+                              <p:par>
+                                <p:cTn id="23" presetID="10" presetClass="entr" presetSubtype="0" fill="hold" grpId="0" nodeType="clickEffect">
+                                  <p:stCondLst>
+                                    <p:cond delay="0"/>
+                                  </p:stCondLst>
+                                  <p:childTnLst>
+                                    <p:set>
+                                      <p:cBhvr>
+                                        <p:cTn id="24" dur="1" fill="hold">
+                                          <p:stCondLst>
+                                            <p:cond delay="0"/>
+                                          </p:stCondLst>
+                                        </p:cTn>
+                                        <p:tgtEl>
+                                          <p:spTgt spid="9"/>
+                                        </p:tgtEl>
+                                        <p:attrNameLst>
+                                          <p:attrName>style.visibility</p:attrName>
+                                        </p:attrNameLst>
+                                      </p:cBhvr>
+                                      <p:to>
+                                        <p:strVal val="visible"/>
+                                      </p:to>
+                                    </p:set>
+                                    <p:animEffect transition="in" filter="fade">
+                                      <p:cBhvr>
+                                        <p:cTn id="25" dur="500"/>
+                                        <p:tgtEl>
+                                          <p:spTgt spid="9"/>
+                                        </p:tgtEl>
+                                      </p:cBhvr>
+                                    </p:animEffect>
+                                  </p:childTnLst>
+                                </p:cTn>
+                              </p:par>
+                              <p:par>
+                                <p:cTn id="26" presetID="10" presetClass="entr" presetSubtype="0" fill="hold" grpId="0" nodeType="withEffect">
+                                  <p:stCondLst>
+                                    <p:cond delay="0"/>
+                                  </p:stCondLst>
+                                  <p:childTnLst>
+                                    <p:set>
+                                      <p:cBhvr>
+                                        <p:cTn id="27" dur="1" fill="hold">
+                                          <p:stCondLst>
+                                            <p:cond delay="0"/>
+                                          </p:stCondLst>
+                                        </p:cTn>
+                                        <p:tgtEl>
+                                          <p:spTgt spid="11"/>
+                                        </p:tgtEl>
+                                        <p:attrNameLst>
+                                          <p:attrName>style.visibility</p:attrName>
+                                        </p:attrNameLst>
+                                      </p:cBhvr>
+                                      <p:to>
+                                        <p:strVal val="visible"/>
+                                      </p:to>
+                                    </p:set>
+                                    <p:animEffect transition="in" filter="fade">
+                                      <p:cBhvr>
+                                        <p:cTn id="28" dur="500"/>
+                                        <p:tgtEl>
+                                          <p:spTgt spid="11"/>
+                                        </p:tgtEl>
+                                      </p:cBhvr>
+                                    </p:animEffect>
+                                  </p:childTnLst>
+                                </p:cTn>
+                              </p:par>
+                              <p:par>
+                                <p:cTn id="29" presetID="10" presetClass="entr" presetSubtype="0" fill="hold" grpId="0" nodeType="withEffect">
+                                  <p:stCondLst>
+                                    <p:cond delay="0"/>
+                                  </p:stCondLst>
+                                  <p:childTnLst>
+                                    <p:set>
+                                      <p:cBhvr>
+                                        <p:cTn id="30" dur="1" fill="hold">
+                                          <p:stCondLst>
+                                            <p:cond delay="0"/>
+                                          </p:stCondLst>
+                                        </p:cTn>
+                                        <p:tgtEl>
+                                          <p:spTgt spid="10"/>
+                                        </p:tgtEl>
+                                        <p:attrNameLst>
+                                          <p:attrName>style.visibility</p:attrName>
+                                        </p:attrNameLst>
+                                      </p:cBhvr>
+                                      <p:to>
+                                        <p:strVal val="visible"/>
+                                      </p:to>
+                                    </p:set>
+                                    <p:animEffect transition="in" filter="fade">
+                                      <p:cBhvr>
+                                        <p:cTn id="31" dur="500"/>
+                                        <p:tgtEl>
+                                          <p:spTgt spid="10"/>
+                                        </p:tgtEl>
+                                      </p:cBhvr>
+                                    </p:animEffect>
+                                  </p:childTnLst>
+                                </p:cTn>
+                              </p:par>
+                            </p:childTnLst>
+                          </p:cTn>
+                        </p:par>
+                      </p:childTnLst>
+                    </p:cTn>
+                  </p:par>
+                  <p:par>
+                    <p:cTn id="32" fill="hold">
+                      <p:stCondLst>
+                        <p:cond delay="indefinite"/>
+                      </p:stCondLst>
+                      <p:childTnLst>
+                        <p:par>
+                          <p:cTn id="33" fill="hold">
+                            <p:stCondLst>
+                              <p:cond delay="0"/>
+                            </p:stCondLst>
+                            <p:childTnLst>
+                              <p:par>
+                                <p:cTn id="34" presetID="10" presetClass="entr" presetSubtype="0" fill="hold" grpId="0" nodeType="clickEffect">
+                                  <p:stCondLst>
+                                    <p:cond delay="0"/>
+                                  </p:stCondLst>
+                                  <p:childTnLst>
+                                    <p:set>
+                                      <p:cBhvr>
+                                        <p:cTn id="35" dur="1" fill="hold">
+                                          <p:stCondLst>
+                                            <p:cond delay="0"/>
+                                          </p:stCondLst>
+                                        </p:cTn>
+                                        <p:tgtEl>
+                                          <p:spTgt spid="12"/>
+                                        </p:tgtEl>
+                                        <p:attrNameLst>
+                                          <p:attrName>style.visibility</p:attrName>
+                                        </p:attrNameLst>
+                                      </p:cBhvr>
+                                      <p:to>
+                                        <p:strVal val="visible"/>
+                                      </p:to>
+                                    </p:set>
+                                    <p:animEffect transition="in" filter="fade">
+                                      <p:cBhvr>
+                                        <p:cTn id="36" dur="500"/>
+                                        <p:tgtEl>
+                                          <p:spTgt spid="12"/>
+                                        </p:tgtEl>
+                                      </p:cBhvr>
+                                    </p:animEffect>
+                                  </p:childTnLst>
+                                </p:cTn>
+                              </p:par>
+                              <p:par>
+                                <p:cTn id="37" presetID="10" presetClass="entr" presetSubtype="0" fill="hold" grpId="0" nodeType="withEffect">
+                                  <p:stCondLst>
+                                    <p:cond delay="0"/>
+                                  </p:stCondLst>
+                                  <p:childTnLst>
+                                    <p:set>
+                                      <p:cBhvr>
+                                        <p:cTn id="38" dur="1" fill="hold">
+                                          <p:stCondLst>
+                                            <p:cond delay="0"/>
+                                          </p:stCondLst>
+                                        </p:cTn>
+                                        <p:tgtEl>
+                                          <p:spTgt spid="15"/>
+                                        </p:tgtEl>
+                                        <p:attrNameLst>
+                                          <p:attrName>style.visibility</p:attrName>
+                                        </p:attrNameLst>
+                                      </p:cBhvr>
+                                      <p:to>
+                                        <p:strVal val="visible"/>
+                                      </p:to>
+                                    </p:set>
+                                    <p:animEffect transition="in" filter="fade">
+                                      <p:cBhvr>
+                                        <p:cTn id="39" dur="500"/>
+                                        <p:tgtEl>
+                                          <p:spTgt spid="15"/>
+                                        </p:tgtEl>
+                                      </p:cBhvr>
+                                    </p:animEffect>
+                                  </p:childTnLst>
+                                </p:cTn>
+                              </p:par>
+                              <p:par>
+                                <p:cTn id="40" presetID="10" presetClass="entr" presetSubtype="0" fill="hold" grpId="0" nodeType="withEffect">
+                                  <p:stCondLst>
+                                    <p:cond delay="0"/>
+                                  </p:stCondLst>
+                                  <p:childTnLst>
+                                    <p:set>
+                                      <p:cBhvr>
+                                        <p:cTn id="41" dur="1" fill="hold">
+                                          <p:stCondLst>
+                                            <p:cond delay="0"/>
+                                          </p:stCondLst>
+                                        </p:cTn>
+                                        <p:tgtEl>
+                                          <p:spTgt spid="14"/>
+                                        </p:tgtEl>
+                                        <p:attrNameLst>
+                                          <p:attrName>style.visibility</p:attrName>
+                                        </p:attrNameLst>
+                                      </p:cBhvr>
+                                      <p:to>
+                                        <p:strVal val="visible"/>
+                                      </p:to>
+                                    </p:set>
+                                    <p:animEffect transition="in" filter="fade">
+                                      <p:cBhvr>
+                                        <p:cTn id="42" dur="500"/>
+                                        <p:tgtEl>
+                                          <p:spTgt spid="14"/>
+                                        </p:tgtEl>
+                                      </p:cBhvr>
+                                    </p:animEffect>
+                                  </p:childTnLst>
+                                </p:cTn>
+                              </p:par>
+                              <p:par>
+                                <p:cTn id="43" presetID="10" presetClass="entr" presetSubtype="0" fill="hold" grpId="0" nodeType="withEffect">
+                                  <p:stCondLst>
+                                    <p:cond delay="0"/>
+                                  </p:stCondLst>
+                                  <p:childTnLst>
+                                    <p:set>
+                                      <p:cBhvr>
+                                        <p:cTn id="44" dur="1" fill="hold">
+                                          <p:stCondLst>
+                                            <p:cond delay="0"/>
+                                          </p:stCondLst>
+                                        </p:cTn>
+                                        <p:tgtEl>
+                                          <p:spTgt spid="13"/>
+                                        </p:tgtEl>
+                                        <p:attrNameLst>
+                                          <p:attrName>style.visibility</p:attrName>
+                                        </p:attrNameLst>
+                                      </p:cBhvr>
+                                      <p:to>
+                                        <p:strVal val="visible"/>
+                                      </p:to>
+                                    </p:set>
+                                    <p:animEffect transition="in" filter="fade">
+                                      <p:cBhvr>
+                                        <p:cTn id="45" dur="500"/>
+                                        <p:tgtEl>
+                                          <p:spTgt spid="13"/>
+                                        </p:tgtEl>
+                                      </p:cBhvr>
+                                    </p:animEffect>
+                                  </p:childTnLst>
+                                </p:cTn>
+                              </p:par>
+                            </p:childTnLst>
+                          </p:cTn>
+                        </p:par>
+                      </p:childTnLst>
+                    </p:cTn>
+                  </p:par>
+                </p:childTnLst>
+              </p:cTn>
+              <p:prevCondLst>
+                <p:cond evt="onPrev" delay="0">
+                  <p:tgtEl>
+                    <p:sldTgt/>
+                  </p:tgtEl>
+                </p:cond>
+              </p:prevCondLst>
+              <p:nextCondLst>
+                <p:cond evt="onNext" delay="0">
+                  <p:tgtEl>
+                    <p:sldTgt/>
+                  </p:tgtEl>
+                </p:cond>
+              </p:nextCondLst>
+            </p:seq>
+          </p:childTnLst>
+        </p:cTn>
+      </p:par>
+    </p:tnLst>
+    <p:bldLst>
+      <p:bldP spid="4" grpId="0" animBg="1"/>
+      <p:bldP spid="5" grpId="0" animBg="1"/>
+      <p:bldP spid="6" grpId="0" animBg="1"/>
+      <p:bldP spid="7" grpId="0" animBg="1"/>
+      <p:bldP spid="9" grpId="0" animBg="1"/>
+      <p:bldP spid="10" grpId="0" animBg="1"/>
+      <p:bldP spid="11" grpId="0" animBg="1"/>
+      <p:bldP spid="12" grpId="0" animBg="1"/>
+      <p:bldP spid="13" grpId="0" animBg="1"/>
+      <p:bldP spid="14" grpId="0" animBg="1"/>
+      <p:bldP spid="15" grpId="0" animBg="1"/>
+    </p:bldLst>
+  </p:timing>
 </p:sld>
 </file>
 
@@ -6736,16 +7944,11 @@
               <a:rPr lang="en-US" dirty="0" smtClean="0"/>
               <a:t>Forms</a:t>
             </a:r>
-            <a:endParaRPr lang="en-US" dirty="0" smtClean="0"/>
-          </a:p>
-          <a:p>
-            <a:r>
-              <a:rPr lang="en-US" dirty="0" smtClean="0"/>
-              <a:t>Jinja </a:t>
-            </a:r>
-            <a:r>
-              <a:rPr lang="en-US" dirty="0" smtClean="0"/>
-              <a:t>templates</a:t>
+          </a:p>
+          <a:p>
+            <a:r>
+              <a:rPr lang="en-US" dirty="0" smtClean="0"/>
+              <a:t>Jinja templates</a:t>
             </a:r>
           </a:p>
           <a:p>
@@ -8619,19 +9822,6 @@
 </file>
 
 <file path=customXml/item1.xml><?xml version="1.0" encoding="utf-8"?>
-<p:properties xmlns:p="http://schemas.microsoft.com/office/2006/metadata/properties" xmlns:xsi="http://www.w3.org/2001/XMLSchema-instance" xmlns:pc="http://schemas.microsoft.com/office/infopath/2007/PartnerControls">
-  <documentManagement>
-    <TaxCatchAll xmlns="230e9df3-be65-4c73-a93b-d1236ebd677e"/>
-    <PublishingExpirationDate xmlns="http://schemas.microsoft.com/sharepoint/v3" xsi:nil="true"/>
-    <PublishingStartDate xmlns="http://schemas.microsoft.com/sharepoint/v3" xsi:nil="true"/>
-    <TaxKeywordTaxHTField xmlns="230e9df3-be65-4c73-a93b-d1236ebd677e">
-      <Terms xmlns="http://schemas.microsoft.com/office/infopath/2007/PartnerControls"/>
-    </TaxKeywordTaxHTField>
-  </documentManagement>
-</p:properties>
-</file>
-
-<file path=customXml/item2.xml><?xml version="1.0" encoding="utf-8"?>
 <ct:contentTypeSchema xmlns:ct="http://schemas.microsoft.com/office/2006/metadata/contentType" xmlns:ma="http://schemas.microsoft.com/office/2006/metadata/properties/metaAttributes" ct:_="" ma:_="" ma:contentTypeName="Document" ma:contentTypeID="0x010100496889825850D44592AC5D2F43187AE4" ma:contentTypeVersion="5" ma:contentTypeDescription="Create a new document." ma:contentTypeScope="" ma:versionID="fde90edb5a63ba841bca516fd2abaf95">
   <xsd:schema xmlns:xsd="http://www.w3.org/2001/XMLSchema" xmlns:xs="http://www.w3.org/2001/XMLSchema" xmlns:p="http://schemas.microsoft.com/office/2006/metadata/properties" xmlns:ns1="http://schemas.microsoft.com/sharepoint/v3" xmlns:ns2="230e9df3-be65-4c73-a93b-d1236ebd677e" xmlns:ns3="27aa9422-7f1f-4c84-9cdf-302b1a67e513" targetNamespace="http://schemas.microsoft.com/office/2006/metadata/properties" ma:root="true" ma:fieldsID="5e7808ae941cc340dbe51a3031959734" ns1:_="" ns2:_="" ns3:_="">
     <xsd:import namespace="http://schemas.microsoft.com/sharepoint/v3"/>
@@ -8813,6 +10003,19 @@
 </ct:contentTypeSchema>
 </file>
 
+<file path=customXml/item2.xml><?xml version="1.0" encoding="utf-8"?>
+<p:properties xmlns:p="http://schemas.microsoft.com/office/2006/metadata/properties" xmlns:xsi="http://www.w3.org/2001/XMLSchema-instance" xmlns:pc="http://schemas.microsoft.com/office/infopath/2007/PartnerControls">
+  <documentManagement>
+    <TaxCatchAll xmlns="230e9df3-be65-4c73-a93b-d1236ebd677e"/>
+    <PublishingExpirationDate xmlns="http://schemas.microsoft.com/sharepoint/v3" xsi:nil="true"/>
+    <PublishingStartDate xmlns="http://schemas.microsoft.com/sharepoint/v3" xsi:nil="true"/>
+    <TaxKeywordTaxHTField xmlns="230e9df3-be65-4c73-a93b-d1236ebd677e">
+      <Terms xmlns="http://schemas.microsoft.com/office/infopath/2007/PartnerControls"/>
+    </TaxKeywordTaxHTField>
+  </documentManagement>
+</p:properties>
+</file>
+
 <file path=customXml/item3.xml><?xml version="1.0" encoding="utf-8"?>
 <?mso-contentType ?>
 <FormTemplates xmlns="http://schemas.microsoft.com/sharepoint/v3/contenttype/forms">
@@ -8823,24 +10026,6 @@
 </file>
 
 <file path=customXml/itemProps1.xml><?xml version="1.0" encoding="utf-8"?>
-<ds:datastoreItem xmlns:ds="http://schemas.openxmlformats.org/officeDocument/2006/customXml" ds:itemID="{7025FDD9-4C58-4084-9F89-0E6ADD6FFF55}">
-  <ds:schemaRefs>
-    <ds:schemaRef ds:uri="230e9df3-be65-4c73-a93b-d1236ebd677e"/>
-    <ds:schemaRef ds:uri="http://schemas.microsoft.com/office/2006/metadata/properties"/>
-    <ds:schemaRef ds:uri="http://purl.org/dc/dcmitype/"/>
-    <ds:schemaRef ds:uri="http://schemas.microsoft.com/office/infopath/2007/PartnerControls"/>
-    <ds:schemaRef ds:uri="http://schemas.openxmlformats.org/package/2006/metadata/core-properties"/>
-    <ds:schemaRef ds:uri="http://schemas.microsoft.com/office/2006/documentManagement/types"/>
-    <ds:schemaRef ds:uri="http://purl.org/dc/elements/1.1/"/>
-    <ds:schemaRef ds:uri="http://schemas.microsoft.com/sharepoint/v3"/>
-    <ds:schemaRef ds:uri="http://www.w3.org/XML/1998/namespace"/>
-    <ds:schemaRef ds:uri="27aa9422-7f1f-4c84-9cdf-302b1a67e513"/>
-    <ds:schemaRef ds:uri="http://purl.org/dc/terms/"/>
-  </ds:schemaRefs>
-</ds:datastoreItem>
-</file>
-
-<file path=customXml/itemProps2.xml><?xml version="1.0" encoding="utf-8"?>
 <ds:datastoreItem xmlns:ds="http://schemas.openxmlformats.org/officeDocument/2006/customXml" ds:itemID="{3253B29C-1CCD-4FE8-A1C4-023A0910DF96}">
   <ds:schemaRefs>
     <ds:schemaRef ds:uri="http://schemas.microsoft.com/office/2006/metadata/contentType"/>
@@ -8860,6 +10045,24 @@
 </ds:datastoreItem>
 </file>
 
+<file path=customXml/itemProps2.xml><?xml version="1.0" encoding="utf-8"?>
+<ds:datastoreItem xmlns:ds="http://schemas.openxmlformats.org/officeDocument/2006/customXml" ds:itemID="{7025FDD9-4C58-4084-9F89-0E6ADD6FFF55}">
+  <ds:schemaRefs>
+    <ds:schemaRef ds:uri="230e9df3-be65-4c73-a93b-d1236ebd677e"/>
+    <ds:schemaRef ds:uri="http://schemas.microsoft.com/office/2006/metadata/properties"/>
+    <ds:schemaRef ds:uri="http://purl.org/dc/dcmitype/"/>
+    <ds:schemaRef ds:uri="http://schemas.microsoft.com/office/infopath/2007/PartnerControls"/>
+    <ds:schemaRef ds:uri="http://schemas.openxmlformats.org/package/2006/metadata/core-properties"/>
+    <ds:schemaRef ds:uri="http://schemas.microsoft.com/office/2006/documentManagement/types"/>
+    <ds:schemaRef ds:uri="http://purl.org/dc/elements/1.1/"/>
+    <ds:schemaRef ds:uri="http://schemas.microsoft.com/sharepoint/v3"/>
+    <ds:schemaRef ds:uri="http://www.w3.org/XML/1998/namespace"/>
+    <ds:schemaRef ds:uri="27aa9422-7f1f-4c84-9cdf-302b1a67e513"/>
+    <ds:schemaRef ds:uri="http://purl.org/dc/terms/"/>
+  </ds:schemaRefs>
+</ds:datastoreItem>
+</file>
+
 <file path=customXml/itemProps3.xml><?xml version="1.0" encoding="utf-8"?>
 <ds:datastoreItem xmlns:ds="http://schemas.openxmlformats.org/officeDocument/2006/customXml" ds:itemID="{B0CA13EC-1D3C-4D6F-8D1C-E8A452CFC79A}">
   <ds:schemaRefs>

</xml_diff>